<commit_message>
Runs and figure changes
</commit_message>
<xml_diff>
--- a/figures/Figure 1/Schematic.pptx
+++ b/figures/Figure 1/Schematic.pptx
@@ -243,7 +243,7 @@
           <a:p>
             <a:fld id="{52D9B48A-4DDE-4515-A7B7-36377E7345FC}" type="datetimeFigureOut">
               <a:rPr lang="en-US" smtClean="0"/>
-              <a:t>8/28/2024</a:t>
+              <a:t>9/11/2024</a:t>
             </a:fld>
             <a:endParaRPr lang="en-US"/>
           </a:p>
@@ -413,7 +413,7 @@
           <a:p>
             <a:fld id="{52D9B48A-4DDE-4515-A7B7-36377E7345FC}" type="datetimeFigureOut">
               <a:rPr lang="en-US" smtClean="0"/>
-              <a:t>8/28/2024</a:t>
+              <a:t>9/11/2024</a:t>
             </a:fld>
             <a:endParaRPr lang="en-US"/>
           </a:p>
@@ -593,7 +593,7 @@
           <a:p>
             <a:fld id="{52D9B48A-4DDE-4515-A7B7-36377E7345FC}" type="datetimeFigureOut">
               <a:rPr lang="en-US" smtClean="0"/>
-              <a:t>8/28/2024</a:t>
+              <a:t>9/11/2024</a:t>
             </a:fld>
             <a:endParaRPr lang="en-US"/>
           </a:p>
@@ -763,7 +763,7 @@
           <a:p>
             <a:fld id="{52D9B48A-4DDE-4515-A7B7-36377E7345FC}" type="datetimeFigureOut">
               <a:rPr lang="en-US" smtClean="0"/>
-              <a:t>8/28/2024</a:t>
+              <a:t>9/11/2024</a:t>
             </a:fld>
             <a:endParaRPr lang="en-US"/>
           </a:p>
@@ -1009,7 +1009,7 @@
           <a:p>
             <a:fld id="{52D9B48A-4DDE-4515-A7B7-36377E7345FC}" type="datetimeFigureOut">
               <a:rPr lang="en-US" smtClean="0"/>
-              <a:t>8/28/2024</a:t>
+              <a:t>9/11/2024</a:t>
             </a:fld>
             <a:endParaRPr lang="en-US"/>
           </a:p>
@@ -1241,7 +1241,7 @@
           <a:p>
             <a:fld id="{52D9B48A-4DDE-4515-A7B7-36377E7345FC}" type="datetimeFigureOut">
               <a:rPr lang="en-US" smtClean="0"/>
-              <a:t>8/28/2024</a:t>
+              <a:t>9/11/2024</a:t>
             </a:fld>
             <a:endParaRPr lang="en-US"/>
           </a:p>
@@ -1608,7 +1608,7 @@
           <a:p>
             <a:fld id="{52D9B48A-4DDE-4515-A7B7-36377E7345FC}" type="datetimeFigureOut">
               <a:rPr lang="en-US" smtClean="0"/>
-              <a:t>8/28/2024</a:t>
+              <a:t>9/11/2024</a:t>
             </a:fld>
             <a:endParaRPr lang="en-US"/>
           </a:p>
@@ -1726,7 +1726,7 @@
           <a:p>
             <a:fld id="{52D9B48A-4DDE-4515-A7B7-36377E7345FC}" type="datetimeFigureOut">
               <a:rPr lang="en-US" smtClean="0"/>
-              <a:t>8/28/2024</a:t>
+              <a:t>9/11/2024</a:t>
             </a:fld>
             <a:endParaRPr lang="en-US"/>
           </a:p>
@@ -1821,7 +1821,7 @@
           <a:p>
             <a:fld id="{52D9B48A-4DDE-4515-A7B7-36377E7345FC}" type="datetimeFigureOut">
               <a:rPr lang="en-US" smtClean="0"/>
-              <a:t>8/28/2024</a:t>
+              <a:t>9/11/2024</a:t>
             </a:fld>
             <a:endParaRPr lang="en-US"/>
           </a:p>
@@ -2098,7 +2098,7 @@
           <a:p>
             <a:fld id="{52D9B48A-4DDE-4515-A7B7-36377E7345FC}" type="datetimeFigureOut">
               <a:rPr lang="en-US" smtClean="0"/>
-              <a:t>8/28/2024</a:t>
+              <a:t>9/11/2024</a:t>
             </a:fld>
             <a:endParaRPr lang="en-US"/>
           </a:p>
@@ -2355,7 +2355,7 @@
           <a:p>
             <a:fld id="{52D9B48A-4DDE-4515-A7B7-36377E7345FC}" type="datetimeFigureOut">
               <a:rPr lang="en-US" smtClean="0"/>
-              <a:t>8/28/2024</a:t>
+              <a:t>9/11/2024</a:t>
             </a:fld>
             <a:endParaRPr lang="en-US"/>
           </a:p>
@@ -2568,7 +2568,7 @@
           <a:p>
             <a:fld id="{52D9B48A-4DDE-4515-A7B7-36377E7345FC}" type="datetimeFigureOut">
               <a:rPr lang="en-US" smtClean="0"/>
-              <a:t>8/28/2024</a:t>
+              <a:t>9/11/2024</a:t>
             </a:fld>
             <a:endParaRPr lang="en-US"/>
           </a:p>
@@ -2973,8 +2973,8 @@
           <a:chExt cx="0" cy="0"/>
         </a:xfrm>
       </p:grpSpPr>
-      <mc:AlternateContent xmlns:mc="http://schemas.openxmlformats.org/markup-compatibility/2006">
-        <mc:Choice xmlns:a14="http://schemas.microsoft.com/office/drawing/2010/main" Requires="a14">
+      <mc:AlternateContent xmlns:mc="http://schemas.openxmlformats.org/markup-compatibility/2006" xmlns:a14="http://schemas.microsoft.com/office/drawing/2010/main">
+        <mc:Choice Requires="a14">
           <p:graphicFrame>
             <p:nvGraphicFramePr>
               <p:cNvPr id="4" name="Table 3">
@@ -3656,7 +3656,7 @@
             </a:graphic>
           </p:graphicFrame>
         </mc:Choice>
-        <mc:Fallback>
+        <mc:Fallback xmlns="">
           <p:graphicFrame>
             <p:nvGraphicFramePr>
               <p:cNvPr id="4" name="Table 3">
@@ -4000,8 +4000,8 @@
           </a:p>
         </p:txBody>
       </p:sp>
-      <mc:AlternateContent xmlns:mc="http://schemas.openxmlformats.org/markup-compatibility/2006" xmlns:a14="http://schemas.microsoft.com/office/drawing/2010/main">
-        <mc:Choice Requires="a14">
+      <mc:AlternateContent xmlns:mc="http://schemas.openxmlformats.org/markup-compatibility/2006">
+        <mc:Choice xmlns:a14="http://schemas.microsoft.com/office/drawing/2010/main" Requires="a14">
           <p:graphicFrame>
             <p:nvGraphicFramePr>
               <p:cNvPr id="18" name="Table 17">
@@ -4017,7 +4017,7 @@
               <p:nvPr>
                 <p:extLst>
                   <p:ext uri="{D42A27DB-BD31-4B8C-83A1-F6EECF244321}">
-                    <p14:modId xmlns:p14="http://schemas.microsoft.com/office/powerpoint/2010/main" val="3067290821"/>
+                    <p14:modId xmlns:p14="http://schemas.microsoft.com/office/powerpoint/2010/main" val="2783627499"/>
                   </p:ext>
                 </p:extLst>
               </p:nvPr>
@@ -4691,7 +4691,7 @@
                               <a:latin typeface="Times New Roman" panose="02020603050405020304" pitchFamily="18" charset="0"/>
                               <a:cs typeface="Times New Roman" panose="02020603050405020304" pitchFamily="18" charset="0"/>
                             </a:rPr>
-                            <a:t>Cell Embedding</a:t>
+                            <a:t>Cell Embedding (CE)</a:t>
                           </a:r>
                         </a:p>
                       </a:txBody>
@@ -4757,7 +4757,7 @@
             </a:graphic>
           </p:graphicFrame>
         </mc:Choice>
-        <mc:Fallback xmlns="">
+        <mc:Fallback>
           <p:graphicFrame>
             <p:nvGraphicFramePr>
               <p:cNvPr id="18" name="Table 17">
@@ -4773,7 +4773,7 @@
               <p:nvPr>
                 <p:extLst>
                   <p:ext uri="{D42A27DB-BD31-4B8C-83A1-F6EECF244321}">
-                    <p14:modId xmlns:p14="http://schemas.microsoft.com/office/powerpoint/2010/main" val="3067290821"/>
+                    <p14:modId xmlns:p14="http://schemas.microsoft.com/office/powerpoint/2010/main" val="2783627499"/>
                   </p:ext>
                 </p:extLst>
               </p:nvPr>
@@ -5006,7 +5006,7 @@
                               <a:latin typeface="Times New Roman" panose="02020603050405020304" pitchFamily="18" charset="0"/>
                               <a:cs typeface="Times New Roman" panose="02020603050405020304" pitchFamily="18" charset="0"/>
                             </a:rPr>
-                            <a:t>Cell Embedding</a:t>
+                            <a:t>Cell Embedding (CE)</a:t>
                           </a:r>
                         </a:p>
                       </a:txBody>
@@ -5291,7 +5291,7 @@
           <p:nvPr>
             <p:extLst>
               <p:ext uri="{D42A27DB-BD31-4B8C-83A1-F6EECF244321}">
-                <p14:modId xmlns:p14="http://schemas.microsoft.com/office/powerpoint/2010/main" val="385476664"/>
+                <p14:modId xmlns:p14="http://schemas.microsoft.com/office/powerpoint/2010/main" val="1163019879"/>
               </p:ext>
             </p:extLst>
           </p:nvPr>
@@ -5556,7 +5556,7 @@
                           <a:latin typeface="Times New Roman" panose="02020603050405020304" pitchFamily="18" charset="0"/>
                           <a:cs typeface="Times New Roman" panose="02020603050405020304" pitchFamily="18" charset="0"/>
                         </a:rPr>
-                        <a:t>Neighbor Embedding</a:t>
+                        <a:t>Neighbor Embedding (NE)</a:t>
                       </a:r>
                     </a:p>
                   </a:txBody>
@@ -6929,84 +6929,255 @@
           </a:p>
         </p:txBody>
       </p:sp>
-      <p:sp>
-        <p:nvSpPr>
-          <p:cNvPr id="37" name="TextBox 36">
-            <a:extLst>
-              <a:ext uri="{FF2B5EF4-FFF2-40B4-BE49-F238E27FC236}">
-                <a16:creationId xmlns:a16="http://schemas.microsoft.com/office/drawing/2014/main" id="{453BA689-28EB-C95D-C103-AF48F9ADF547}"/>
-              </a:ext>
-            </a:extLst>
-          </p:cNvPr>
-          <p:cNvSpPr txBox="1"/>
-          <p:nvPr/>
-        </p:nvSpPr>
-        <p:spPr>
-          <a:xfrm rot="16200000">
-            <a:off x="10075674" y="4132211"/>
-            <a:ext cx="881475" cy="276999"/>
-          </a:xfrm>
-          <a:prstGeom prst="rect">
-            <a:avLst/>
-          </a:prstGeom>
-          <a:noFill/>
-        </p:spPr>
-        <p:txBody>
-          <a:bodyPr wrap="square" rtlCol="0" anchor="b">
-            <a:spAutoFit/>
-          </a:bodyPr>
-          <a:lstStyle/>
-          <a:p>
-            <a:pPr algn="ctr"/>
-            <a:r>
-              <a:rPr lang="en-US" sz="1200" i="1" dirty="0">
-                <a:latin typeface="Helvetica" pitchFamily="2" charset="0"/>
-                <a:cs typeface="Calibri" panose="020F0502020204030204" pitchFamily="34" charset="0"/>
-              </a:rPr>
-              <a:t>#Cells - 1</a:t>
-            </a:r>
-          </a:p>
-        </p:txBody>
-      </p:sp>
-      <p:sp>
-        <p:nvSpPr>
-          <p:cNvPr id="38" name="TextBox 37">
-            <a:extLst>
-              <a:ext uri="{FF2B5EF4-FFF2-40B4-BE49-F238E27FC236}">
-                <a16:creationId xmlns:a16="http://schemas.microsoft.com/office/drawing/2014/main" id="{364BAB8D-BDE6-949A-EAF0-892D9DE89922}"/>
-              </a:ext>
-            </a:extLst>
-          </p:cNvPr>
-          <p:cNvSpPr txBox="1"/>
-          <p:nvPr/>
-        </p:nvSpPr>
-        <p:spPr>
-          <a:xfrm>
-            <a:off x="2880827" y="2993521"/>
-            <a:ext cx="1136525" cy="276999"/>
-          </a:xfrm>
-          <a:prstGeom prst="rect">
-            <a:avLst/>
-          </a:prstGeom>
-          <a:noFill/>
-        </p:spPr>
-        <p:txBody>
-          <a:bodyPr wrap="square" rtlCol="0" anchor="b">
-            <a:spAutoFit/>
-          </a:bodyPr>
-          <a:lstStyle/>
-          <a:p>
-            <a:pPr algn="ctr"/>
-            <a:r>
-              <a:rPr lang="en-US" sz="1200" i="1" dirty="0">
-                <a:latin typeface="Helvetica" pitchFamily="2" charset="0"/>
-                <a:cs typeface="Calibri" panose="020F0502020204030204" pitchFamily="34" charset="0"/>
-              </a:rPr>
-              <a:t>#Cells</a:t>
-            </a:r>
-          </a:p>
-        </p:txBody>
-      </p:sp>
+      <mc:AlternateContent xmlns:mc="http://schemas.openxmlformats.org/markup-compatibility/2006">
+        <mc:Choice xmlns:a14="http://schemas.microsoft.com/office/drawing/2010/main" Requires="a14">
+          <p:sp>
+            <p:nvSpPr>
+              <p:cNvPr id="37" name="TextBox 36">
+                <a:extLst>
+                  <a:ext uri="{FF2B5EF4-FFF2-40B4-BE49-F238E27FC236}">
+                    <a16:creationId xmlns:a16="http://schemas.microsoft.com/office/drawing/2014/main" id="{453BA689-28EB-C95D-C103-AF48F9ADF547}"/>
+                  </a:ext>
+                </a:extLst>
+              </p:cNvPr>
+              <p:cNvSpPr txBox="1"/>
+              <p:nvPr/>
+            </p:nvSpPr>
+            <p:spPr>
+              <a:xfrm rot="16200000">
+                <a:off x="10075674" y="4101434"/>
+                <a:ext cx="881475" cy="338554"/>
+              </a:xfrm>
+              <a:prstGeom prst="rect">
+                <a:avLst/>
+              </a:prstGeom>
+              <a:noFill/>
+            </p:spPr>
+            <p:txBody>
+              <a:bodyPr wrap="square" rtlCol="0" anchor="b">
+                <a:spAutoFit/>
+              </a:bodyPr>
+              <a:lstStyle/>
+              <a:p>
+                <a:pPr algn="ctr"/>
+                <a14:m>
+                  <m:oMathPara xmlns:m="http://schemas.openxmlformats.org/officeDocument/2006/math">
+                    <m:oMathParaPr>
+                      <m:jc m:val="centerGroup"/>
+                    </m:oMathParaPr>
+                    <m:oMath xmlns:m="http://schemas.openxmlformats.org/officeDocument/2006/math">
+                      <m:sSub>
+                        <m:sSubPr>
+                          <m:ctrlPr>
+                            <a:rPr lang="en-US" sz="1600" b="0" i="1" dirty="0" smtClean="0">
+                              <a:latin typeface="Cambria Math" panose="02040503050406030204" pitchFamily="18" charset="0"/>
+                              <a:cs typeface="Calibri" panose="020F0502020204030204" pitchFamily="34" charset="0"/>
+                            </a:rPr>
+                          </m:ctrlPr>
+                        </m:sSubPr>
+                        <m:e>
+                          <m:r>
+                            <a:rPr lang="en-US" sz="1600" b="0" i="1" dirty="0" smtClean="0">
+                              <a:latin typeface="Cambria Math" panose="02040503050406030204" pitchFamily="18" charset="0"/>
+                              <a:cs typeface="Calibri" panose="020F0502020204030204" pitchFamily="34" charset="0"/>
+                            </a:rPr>
+                            <m:t>𝑛</m:t>
+                          </m:r>
+                        </m:e>
+                        <m:sub>
+                          <m:r>
+                            <a:rPr lang="en-US" sz="1600" b="0" i="1" dirty="0" smtClean="0">
+                              <a:latin typeface="Cambria Math" panose="02040503050406030204" pitchFamily="18" charset="0"/>
+                              <a:cs typeface="Calibri" panose="020F0502020204030204" pitchFamily="34" charset="0"/>
+                            </a:rPr>
+                            <m:t>𝑐</m:t>
+                          </m:r>
+                        </m:sub>
+                      </m:sSub>
+                      <m:r>
+                        <a:rPr lang="en-US" sz="1600" b="0" i="1" dirty="0" smtClean="0">
+                          <a:latin typeface="Cambria Math" panose="02040503050406030204" pitchFamily="18" charset="0"/>
+                          <a:cs typeface="Calibri" panose="020F0502020204030204" pitchFamily="34" charset="0"/>
+                        </a:rPr>
+                        <m:t>−1</m:t>
+                      </m:r>
+                    </m:oMath>
+                  </m:oMathPara>
+                </a14:m>
+                <a:endParaRPr lang="en-US" sz="1600" i="1" dirty="0">
+                  <a:latin typeface="Helvetica" pitchFamily="2" charset="0"/>
+                  <a:cs typeface="Calibri" panose="020F0502020204030204" pitchFamily="34" charset="0"/>
+                </a:endParaRPr>
+              </a:p>
+            </p:txBody>
+          </p:sp>
+        </mc:Choice>
+        <mc:Fallback>
+          <p:sp>
+            <p:nvSpPr>
+              <p:cNvPr id="37" name="TextBox 36">
+                <a:extLst>
+                  <a:ext uri="{FF2B5EF4-FFF2-40B4-BE49-F238E27FC236}">
+                    <a16:creationId xmlns:a16="http://schemas.microsoft.com/office/drawing/2014/main" id="{453BA689-28EB-C95D-C103-AF48F9ADF547}"/>
+                  </a:ext>
+                </a:extLst>
+              </p:cNvPr>
+              <p:cNvSpPr txBox="1">
+                <a:spLocks noRot="1" noChangeAspect="1" noMove="1" noResize="1" noEditPoints="1" noAdjustHandles="1" noChangeArrowheads="1" noChangeShapeType="1" noTextEdit="1"/>
+              </p:cNvSpPr>
+              <p:nvPr/>
+            </p:nvSpPr>
+            <p:spPr>
+              <a:xfrm rot="16200000">
+                <a:off x="10075674" y="4101434"/>
+                <a:ext cx="881475" cy="338554"/>
+              </a:xfrm>
+              <a:prstGeom prst="rect">
+                <a:avLst/>
+              </a:prstGeom>
+              <a:blipFill>
+                <a:blip r:embed="rId4"/>
+                <a:stretch>
+                  <a:fillRect/>
+                </a:stretch>
+              </a:blipFill>
+            </p:spPr>
+            <p:txBody>
+              <a:bodyPr/>
+              <a:lstStyle/>
+              <a:p>
+                <a:r>
+                  <a:rPr lang="en-US">
+                    <a:noFill/>
+                  </a:rPr>
+                  <a:t> </a:t>
+                </a:r>
+              </a:p>
+            </p:txBody>
+          </p:sp>
+        </mc:Fallback>
+      </mc:AlternateContent>
+      <mc:AlternateContent xmlns:mc="http://schemas.openxmlformats.org/markup-compatibility/2006">
+        <mc:Choice xmlns:a14="http://schemas.microsoft.com/office/drawing/2010/main" Requires="a14">
+          <p:sp>
+            <p:nvSpPr>
+              <p:cNvPr id="38" name="TextBox 37">
+                <a:extLst>
+                  <a:ext uri="{FF2B5EF4-FFF2-40B4-BE49-F238E27FC236}">
+                    <a16:creationId xmlns:a16="http://schemas.microsoft.com/office/drawing/2014/main" id="{364BAB8D-BDE6-949A-EAF0-892D9DE89922}"/>
+                  </a:ext>
+                </a:extLst>
+              </p:cNvPr>
+              <p:cNvSpPr txBox="1"/>
+              <p:nvPr/>
+            </p:nvSpPr>
+            <p:spPr>
+              <a:xfrm>
+                <a:off x="2880827" y="2931966"/>
+                <a:ext cx="1136525" cy="338554"/>
+              </a:xfrm>
+              <a:prstGeom prst="rect">
+                <a:avLst/>
+              </a:prstGeom>
+              <a:noFill/>
+            </p:spPr>
+            <p:txBody>
+              <a:bodyPr wrap="square" rtlCol="0" anchor="b">
+                <a:spAutoFit/>
+              </a:bodyPr>
+              <a:lstStyle/>
+              <a:p>
+                <a:pPr algn="ctr"/>
+                <a14:m>
+                  <m:oMathPara xmlns:m="http://schemas.openxmlformats.org/officeDocument/2006/math">
+                    <m:oMathParaPr>
+                      <m:jc m:val="centerGroup"/>
+                    </m:oMathParaPr>
+                    <m:oMath xmlns:m="http://schemas.openxmlformats.org/officeDocument/2006/math">
+                      <m:sSub>
+                        <m:sSubPr>
+                          <m:ctrlPr>
+                            <a:rPr lang="en-US" sz="1600" b="0" i="1" dirty="0" smtClean="0">
+                              <a:latin typeface="Cambria Math" panose="02040503050406030204" pitchFamily="18" charset="0"/>
+                              <a:cs typeface="Calibri" panose="020F0502020204030204" pitchFamily="34" charset="0"/>
+                            </a:rPr>
+                          </m:ctrlPr>
+                        </m:sSubPr>
+                        <m:e>
+                          <m:r>
+                            <a:rPr lang="en-US" sz="1600" b="0" i="1" dirty="0" smtClean="0">
+                              <a:latin typeface="Cambria Math" panose="02040503050406030204" pitchFamily="18" charset="0"/>
+                              <a:cs typeface="Calibri" panose="020F0502020204030204" pitchFamily="34" charset="0"/>
+                            </a:rPr>
+                            <m:t>𝑛</m:t>
+                          </m:r>
+                        </m:e>
+                        <m:sub>
+                          <m:r>
+                            <a:rPr lang="en-US" sz="1600" b="0" i="1" dirty="0" smtClean="0">
+                              <a:latin typeface="Cambria Math" panose="02040503050406030204" pitchFamily="18" charset="0"/>
+                              <a:cs typeface="Calibri" panose="020F0502020204030204" pitchFamily="34" charset="0"/>
+                            </a:rPr>
+                            <m:t>𝑐</m:t>
+                          </m:r>
+                        </m:sub>
+                      </m:sSub>
+                    </m:oMath>
+                  </m:oMathPara>
+                </a14:m>
+                <a:endParaRPr lang="en-US" sz="1600" i="1" dirty="0">
+                  <a:latin typeface="Helvetica" pitchFamily="2" charset="0"/>
+                  <a:cs typeface="Calibri" panose="020F0502020204030204" pitchFamily="34" charset="0"/>
+                </a:endParaRPr>
+              </a:p>
+            </p:txBody>
+          </p:sp>
+        </mc:Choice>
+        <mc:Fallback>
+          <p:sp>
+            <p:nvSpPr>
+              <p:cNvPr id="38" name="TextBox 37">
+                <a:extLst>
+                  <a:ext uri="{FF2B5EF4-FFF2-40B4-BE49-F238E27FC236}">
+                    <a16:creationId xmlns:a16="http://schemas.microsoft.com/office/drawing/2014/main" id="{364BAB8D-BDE6-949A-EAF0-892D9DE89922}"/>
+                  </a:ext>
+                </a:extLst>
+              </p:cNvPr>
+              <p:cNvSpPr txBox="1">
+                <a:spLocks noRot="1" noChangeAspect="1" noMove="1" noResize="1" noEditPoints="1" noAdjustHandles="1" noChangeArrowheads="1" noChangeShapeType="1" noTextEdit="1"/>
+              </p:cNvSpPr>
+              <p:nvPr/>
+            </p:nvSpPr>
+            <p:spPr>
+              <a:xfrm>
+                <a:off x="2880827" y="2931966"/>
+                <a:ext cx="1136525" cy="338554"/>
+              </a:xfrm>
+              <a:prstGeom prst="rect">
+                <a:avLst/>
+              </a:prstGeom>
+              <a:blipFill>
+                <a:blip r:embed="rId5"/>
+                <a:stretch>
+                  <a:fillRect/>
+                </a:stretch>
+              </a:blipFill>
+            </p:spPr>
+            <p:txBody>
+              <a:bodyPr/>
+              <a:lstStyle/>
+              <a:p>
+                <a:r>
+                  <a:rPr lang="en-US">
+                    <a:noFill/>
+                  </a:rPr>
+                  <a:t> </a:t>
+                </a:r>
+              </a:p>
+            </p:txBody>
+          </p:sp>
+        </mc:Fallback>
+      </mc:AlternateContent>
       <p:sp>
         <p:nvSpPr>
           <p:cNvPr id="40" name="Oval 39">
@@ -11291,7 +11462,7 @@
                           <a:tailEnd type="none" w="med" len="med"/>
                         </a:lnB>
                         <a:blipFill>
-                          <a:blip r:embed="rId4"/>
+                          <a:blip r:embed="rId6"/>
                           <a:stretch>
                             <a:fillRect l="-820" t="-3226" r="-1639" b="-8065"/>
                           </a:stretch>
@@ -11454,7 +11625,7 @@
         </p:nvSpPr>
         <p:spPr>
           <a:xfrm>
-            <a:off x="990514" y="1988925"/>
+            <a:off x="900864" y="2006855"/>
             <a:ext cx="2468038" cy="276999"/>
           </a:xfrm>
           <a:prstGeom prst="rect">
@@ -11492,7 +11663,7 @@
         </p:nvSpPr>
         <p:spPr>
           <a:xfrm>
-            <a:off x="981051" y="828484"/>
+            <a:off x="891401" y="846414"/>
             <a:ext cx="1634012" cy="276999"/>
           </a:xfrm>
           <a:prstGeom prst="rect">

</xml_diff>